<commit_message>
Update technical case docs and add new PDFs
Updated several .docx and .pptx files related to CloudWalk technical cases and presentations. Added new PDF versions for Anti-Fraud Solution, Transactional Analysis, and a presentation, providing easier access to finalized documents.
</commit_message>
<xml_diff>
--- a/docs/presentations/Transaction Analysis.pptx
+++ b/docs/presentations/Transaction Analysis.pptx
@@ -548,6 +548,24 @@
           <a:bodyPr/>
           <a:lstStyle/>
           <a:p>
+            <a:r>
+              <a:rPr lang="en-US" dirty="0"/>
+              <a:t>“Good morning/afternoon. Thank you for the opportunity to present my findings on the sample transactional data.”</a:t>
+            </a:r>
+          </a:p>
+          <a:p>
+            <a:r>
+              <a:rPr lang="en-US" dirty="0"/>
+              <a:t>“Today, I will walk you through key insights, recommend additional data to improve detection, and propose prevention strategies.”</a:t>
+            </a:r>
+          </a:p>
+          <a:p>
+            <a:r>
+              <a:rPr lang="en-US" dirty="0"/>
+              <a:t>“Let’s begin with an overview of our discussion topics.”</a:t>
+            </a:r>
+          </a:p>
+          <a:p>
             <a:endParaRPr lang="pt-BR" dirty="0"/>
           </a:p>
         </p:txBody>
@@ -633,9 +651,68 @@
           <a:lstStyle/>
           <a:p>
             <a:r>
-              <a:rPr lang="pt-BR"/>
-              <a:t>Sub-acquirers serve as intermediaries that provide services to merchants, often helping smaller businesses process payments without needing direct contracts with acquirers.</a:t>
-            </a:r>
+              <a:rPr lang="en-US" b="1" dirty="0"/>
+              <a:t>Hybrid Rule‑and‑ML Engine</a:t>
+            </a:r>
+            <a:endParaRPr lang="en-US" dirty="0"/>
+          </a:p>
+          <a:p>
+            <a:pPr lvl="1"/>
+            <a:r>
+              <a:rPr lang="en-US" dirty="0"/>
+              <a:t>“Start with deterministic rules (velocity, amount bins) and plan for ML augmentation later.”</a:t>
+            </a:r>
+          </a:p>
+          <a:p>
+            <a:r>
+              <a:rPr lang="en-US" b="1" dirty="0"/>
+              <a:t>Step‑Up Authentication</a:t>
+            </a:r>
+            <a:endParaRPr lang="en-US" dirty="0"/>
+          </a:p>
+          <a:p>
+            <a:pPr lvl="1"/>
+            <a:r>
+              <a:rPr lang="en-US" dirty="0"/>
+              <a:t>“Trigger 3D Secure or OTP for medium‑risk transactions (e.g., new device, high value, off‑hours).”</a:t>
+            </a:r>
+          </a:p>
+          <a:p>
+            <a:r>
+              <a:rPr lang="en-US" b="1" dirty="0"/>
+              <a:t>Manual Review &amp; Rapid Response</a:t>
+            </a:r>
+            <a:endParaRPr lang="en-US" dirty="0"/>
+          </a:p>
+          <a:p>
+            <a:pPr lvl="1"/>
+            <a:r>
+              <a:rPr lang="en-US" dirty="0"/>
+              <a:t>“Automatically route flagged transactions to a dedicated team for same‑day investigation.”</a:t>
+            </a:r>
+          </a:p>
+          <a:p>
+            <a:r>
+              <a:rPr lang="en-US" b="1" dirty="0"/>
+              <a:t>Continuous Monitoring &amp; Feedback Loop</a:t>
+            </a:r>
+            <a:endParaRPr lang="en-US" dirty="0"/>
+          </a:p>
+          <a:p>
+            <a:pPr lvl="1"/>
+            <a:r>
+              <a:rPr lang="en-US" dirty="0"/>
+              <a:t>“Ingest dispute outcomes to refine rule thresholds and train future models, ensuring the system adapts to new fraud patterns.”</a:t>
+            </a:r>
+          </a:p>
+          <a:p>
+            <a:r>
+              <a:rPr lang="en-US" dirty="0"/>
+              <a:t>“This multi‑tiered approach balances risk mitigation with customer experience.”</a:t>
+            </a:r>
+          </a:p>
+          <a:p>
+            <a:endParaRPr lang="pt-BR" dirty="0"/>
           </a:p>
         </p:txBody>
       </p:sp>
@@ -719,6 +796,48 @@
           <a:bodyPr/>
           <a:lstStyle/>
           <a:p>
+            <a:r>
+              <a:rPr lang="en-US" dirty="0"/>
+              <a:t>“Our presentation is organized into three main sections:”</a:t>
+            </a:r>
+          </a:p>
+          <a:p>
+            <a:r>
+              <a:rPr lang="en-US" b="1" dirty="0"/>
+              <a:t>Data Analysis &amp; Key Findings</a:t>
+            </a:r>
+            <a:r>
+              <a:rPr lang="en-US" dirty="0"/>
+              <a:t> – what suspicious behaviors we uncovered.</a:t>
+            </a:r>
+          </a:p>
+          <a:p>
+            <a:r>
+              <a:rPr lang="en-US" b="1" dirty="0"/>
+              <a:t>Additional Data to Enhance Fraud Detection</a:t>
+            </a:r>
+            <a:r>
+              <a:rPr lang="en-US" dirty="0"/>
+              <a:t> – which new signals to integrate.</a:t>
+            </a:r>
+          </a:p>
+          <a:p>
+            <a:r>
+              <a:rPr lang="en-US" b="1" dirty="0"/>
+              <a:t>Fraud &amp; Chargeback Prevention Recommendations</a:t>
+            </a:r>
+            <a:r>
+              <a:rPr lang="en-US" dirty="0"/>
+              <a:t> – how to act on these insights.</a:t>
+            </a:r>
+          </a:p>
+          <a:p>
+            <a:r>
+              <a:rPr lang="en-US" dirty="0"/>
+              <a:t>“We will conclude with next steps and open the floor for questions.”</a:t>
+            </a:r>
+          </a:p>
+          <a:p>
             <a:endParaRPr lang="pt-BR" dirty="0"/>
           </a:p>
         </p:txBody>
@@ -803,6 +922,18 @@
           <a:bodyPr/>
           <a:lstStyle/>
           <a:p>
+            <a:r>
+              <a:rPr lang="en-US" dirty="0"/>
+              <a:t>“In this section, we dive into the transactional dataset of 3 199 records with a 12.2 % chargeback rate.”</a:t>
+            </a:r>
+          </a:p>
+          <a:p>
+            <a:r>
+              <a:rPr lang="en-US" dirty="0"/>
+              <a:t>“I’ll highlight three patterns: high‑risk users/devices, test‑and‑hit behaviors, and temporal clustering.”</a:t>
+            </a:r>
+          </a:p>
+          <a:p>
             <a:endParaRPr lang="pt-BR" dirty="0"/>
           </a:p>
         </p:txBody>
@@ -886,6 +1017,66 @@
         <p:txBody>
           <a:bodyPr/>
           <a:lstStyle/>
+          <a:p>
+            <a:r>
+              <a:rPr lang="en-US" dirty="0"/>
+              <a:t>“First, a small group of </a:t>
+            </a:r>
+            <a:r>
+              <a:rPr lang="en-US" b="1" dirty="0"/>
+              <a:t>five users</a:t>
+            </a:r>
+            <a:r>
+              <a:rPr lang="en-US" dirty="0"/>
+              <a:t> accounts for over 80 % chargeback rate, despite minimal transaction volume.”</a:t>
+            </a:r>
+          </a:p>
+          <a:p>
+            <a:r>
+              <a:rPr lang="en-US" dirty="0"/>
+              <a:t>“Similarly, certain </a:t>
+            </a:r>
+            <a:r>
+              <a:rPr lang="en-US" b="1" dirty="0"/>
+              <a:t>devices</a:t>
+            </a:r>
+            <a:r>
+              <a:rPr lang="en-US" dirty="0"/>
+              <a:t> show chargeback rates up to 93 %.”</a:t>
+            </a:r>
+          </a:p>
+          <a:p>
+            <a:r>
+              <a:rPr lang="en-US" dirty="0"/>
+              <a:t>“Such concentration suggests either credential misuse or “friendly fraud” by repeat offenders.”</a:t>
+            </a:r>
+          </a:p>
+          <a:p>
+            <a:r>
+              <a:rPr lang="en-US" b="1" dirty="0"/>
+              <a:t>Action:</a:t>
+            </a:r>
+            <a:r>
+              <a:rPr lang="en-US" dirty="0"/>
+              <a:t> “I recommend placing these </a:t>
+            </a:r>
+            <a:r>
+              <a:rPr lang="en-US" dirty="0" err="1"/>
+              <a:t>user_ids</a:t>
+            </a:r>
+            <a:r>
+              <a:rPr lang="en-US" dirty="0"/>
+              <a:t> and </a:t>
+            </a:r>
+            <a:r>
+              <a:rPr lang="en-US" dirty="0" err="1"/>
+              <a:t>device_ids</a:t>
+            </a:r>
+            <a:r>
+              <a:rPr lang="en-US" dirty="0"/>
+              <a:t> into a manual‑review queue with heightened authentication.”</a:t>
+            </a:r>
+          </a:p>
           <a:p>
             <a:endParaRPr lang="pt-BR" dirty="0"/>
           </a:p>
@@ -989,6 +1180,28 @@
           <a:bodyPr/>
           <a:lstStyle/>
           <a:p>
+            <a:r>
+              <a:rPr lang="en-US" dirty="0"/>
+              <a:t>“Next, we see chargebacks spike in the R$ 0–100 and R$ 100–200 bins, then dip, then re‑emerge at higher values.”</a:t>
+            </a:r>
+          </a:p>
+          <a:p>
+            <a:r>
+              <a:rPr lang="en-US" dirty="0"/>
+              <a:t>“This “test small amount → validate stolen card → larger fraud” cycle is a classic CNP fraud tactic.”</a:t>
+            </a:r>
+          </a:p>
+          <a:p>
+            <a:r>
+              <a:rPr lang="en-US" b="1" dirty="0"/>
+              <a:t>Action:</a:t>
+            </a:r>
+            <a:r>
+              <a:rPr lang="en-US" dirty="0"/>
+              <a:t> “Implement dynamic amount‑based velocity rules to decline or challenge sequential small‑value attempts followed by larger purchases.”</a:t>
+            </a:r>
+          </a:p>
+          <a:p>
             <a:endParaRPr lang="pt-BR" dirty="0"/>
           </a:p>
         </p:txBody>
@@ -1097,6 +1310,36 @@
           <a:bodyPr/>
           <a:lstStyle/>
           <a:p>
+            <a:r>
+              <a:rPr lang="en-US" dirty="0"/>
+              <a:t>“Our heatmap analysis reveals chargebacks cluster in </a:t>
+            </a:r>
+            <a:r>
+              <a:rPr lang="en-US" b="1" dirty="0"/>
+              <a:t>off‑peak hours</a:t>
+            </a:r>
+            <a:r>
+              <a:rPr lang="en-US" dirty="0"/>
+              <a:t>—particularly midnight to 4 a.m.—when manual review is slowest.”</a:t>
+            </a:r>
+          </a:p>
+          <a:p>
+            <a:r>
+              <a:rPr lang="en-US" dirty="0"/>
+              <a:t>“This timing indicates automated or scripted fraud attempts.”</a:t>
+            </a:r>
+          </a:p>
+          <a:p>
+            <a:r>
+              <a:rPr lang="en-US" b="1" dirty="0"/>
+              <a:t>Action:</a:t>
+            </a:r>
+            <a:r>
+              <a:rPr lang="en-US" dirty="0"/>
+              <a:t> “Tighten real‑time monitoring and lower risk thresholds during these high‑risk windows (e.g., require 3D Secure).”</a:t>
+            </a:r>
+          </a:p>
+          <a:p>
             <a:endParaRPr lang="pt-BR" dirty="0"/>
           </a:p>
         </p:txBody>
@@ -1188,8 +1431,14 @@
           <a:lstStyle/>
           <a:p>
             <a:r>
-              <a:rPr lang="pt-BR"/>
-              <a:t>Information flow is equally important as money flow, as it ensures the proper processing of transactions. This section will explore how information moves through different stages of a transaction.</a:t>
+              <a:rPr lang="en-US" dirty="0"/>
+              <a:t>“Beyond transactional logs, integrating external signals can improve detection accuracy.”</a:t>
+            </a:r>
+          </a:p>
+          <a:p>
+            <a:r>
+              <a:rPr lang="en-US" dirty="0"/>
+              <a:t>“We will consider four categories of data in the next slide.”</a:t>
             </a:r>
           </a:p>
         </p:txBody>
@@ -1274,6 +1523,52 @@
           <a:bodyPr/>
           <a:lstStyle/>
           <a:p>
+            <a:r>
+              <a:rPr lang="pt-BR" b="1" dirty="0"/>
+              <a:t>Device &amp; Network Metadata</a:t>
+            </a:r>
+            <a:r>
+              <a:rPr lang="pt-BR" dirty="0"/>
+              <a:t>: “IP geolocation, VPN/proxy flags, and browser fingerprint scores help identify anomalous access.”</a:t>
+            </a:r>
+          </a:p>
+          <a:p>
+            <a:r>
+              <a:rPr lang="pt-BR" b="1" dirty="0"/>
+              <a:t>Customer Profile &amp; Historical Trends</a:t>
+            </a:r>
+            <a:r>
+              <a:rPr lang="pt-BR" dirty="0"/>
+              <a:t>: “Lifetime chargeback history and average basket size reveal account‑level risk.”</a:t>
+            </a:r>
+          </a:p>
+          <a:p>
+            <a:r>
+              <a:rPr lang="pt-BR" b="1" dirty="0"/>
+              <a:t>Order Fulfillment Data</a:t>
+            </a:r>
+            <a:r>
+              <a:rPr lang="pt-BR" dirty="0"/>
+              <a:t>: “Shipping address velocity and proof‑of‑delivery images validate legitimate orders.”</a:t>
+            </a:r>
+          </a:p>
+          <a:p>
+            <a:r>
+              <a:rPr lang="pt-BR" b="1" dirty="0"/>
+              <a:t>External Fraud Feeds</a:t>
+            </a:r>
+            <a:r>
+              <a:rPr lang="pt-BR" dirty="0"/>
+              <a:t>: “BIN risk scores and peer‑merchant deny lists provide community‑wide intelligence.”</a:t>
+            </a:r>
+          </a:p>
+          <a:p>
+            <a:r>
+              <a:rPr lang="pt-BR" dirty="0"/>
+              <a:t>“Integrating these feeds will enrich our rule engine and reduce false positives.”</a:t>
+            </a:r>
+          </a:p>
+          <a:p>
             <a:endParaRPr lang="pt-BR" dirty="0"/>
           </a:p>
         </p:txBody>
@@ -1357,6 +1652,18 @@
         <p:txBody>
           <a:bodyPr/>
           <a:lstStyle/>
+          <a:p>
+            <a:r>
+              <a:rPr lang="en-US" dirty="0"/>
+              <a:t>“Based on our findings, I propose a layered prevention framework combining rules, authentication, and operational processes.”</a:t>
+            </a:r>
+          </a:p>
+          <a:p>
+            <a:r>
+              <a:rPr lang="en-US" dirty="0"/>
+              <a:t>“The next slide details actionable steps.”</a:t>
+            </a:r>
+          </a:p>
           <a:p>
             <a:endParaRPr lang="pt-BR" dirty="0"/>
           </a:p>
@@ -4833,7 +5140,7 @@
               <a:tabLst/>
               <a:defRPr/>
             </a:pPr>
-            <a:endParaRPr kumimoji="0" lang="en-US" sz="1800" b="0" i="0" u="none" strike="noStrike" kern="1200" cap="none" spc="0" normalizeH="0" baseline="0" noProof="0">
+            <a:endParaRPr kumimoji="0" lang="en-US" sz="1800" b="0" i="0" u="none" strike="noStrike" kern="1200" cap="none" spc="0" normalizeH="0" baseline="0" noProof="0" dirty="0">
               <a:ln>
                 <a:noFill/>
               </a:ln>
@@ -5030,7 +5337,7 @@
               <a:tabLst/>
               <a:defRPr/>
             </a:pPr>
-            <a:endParaRPr kumimoji="0" lang="en-US" sz="1800" b="0" i="0" u="none" strike="noStrike" kern="1200" cap="none" spc="0" normalizeH="0" baseline="0" noProof="0">
+            <a:endParaRPr kumimoji="0" lang="en-US" sz="1800" b="0" i="0" u="none" strike="noStrike" kern="1200" cap="none" spc="0" normalizeH="0" baseline="0" noProof="0" dirty="0">
               <a:ln>
                 <a:noFill/>
               </a:ln>
@@ -5076,42 +5383,15 @@
           <a:lstStyle/>
           <a:p>
             <a:r>
-              <a:rPr lang="pt-BR" sz="6000" dirty="0" err="1">
+              <a:rPr lang="en-US" sz="6000" noProof="0" dirty="0">
                 <a:ln>
                   <a:solidFill>
                     <a:schemeClr val="tx1"/>
                   </a:solidFill>
                 </a:ln>
               </a:rPr>
-              <a:t>Transactional</a:t>
-            </a:r>
-            <a:r>
-              <a:rPr lang="pt-BR" sz="6000" dirty="0">
-                <a:ln>
-                  <a:solidFill>
-                    <a:schemeClr val="tx1"/>
-                  </a:solidFill>
-                </a:ln>
-              </a:rPr>
-              <a:t> </a:t>
-            </a:r>
-            <a:r>
-              <a:rPr lang="pt-BR" sz="6000" dirty="0" err="1">
-                <a:ln>
-                  <a:solidFill>
-                    <a:schemeClr val="tx1"/>
-                  </a:solidFill>
-                </a:ln>
-              </a:rPr>
-              <a:t>analysis</a:t>
-            </a:r>
-            <a:endParaRPr lang="pt-BR" sz="6000" dirty="0">
-              <a:ln>
-                <a:solidFill>
-                  <a:schemeClr val="tx1"/>
-                </a:solidFill>
-              </a:ln>
-            </a:endParaRPr>
+              <a:t>Transactional analysis</a:t>
+            </a:r>
           </a:p>
         </p:txBody>
       </p:sp>
@@ -5145,20 +5425,8 @@
           <a:p>
             <a:pPr algn="ctr"/>
             <a:r>
-              <a:rPr lang="pt-BR" sz="2200" dirty="0" err="1"/>
-              <a:t>Understanding</a:t>
-            </a:r>
-            <a:r>
-              <a:rPr lang="pt-BR" sz="2200" dirty="0"/>
-              <a:t> </a:t>
-            </a:r>
-            <a:r>
-              <a:rPr lang="pt-BR" sz="2200" dirty="0" err="1"/>
-              <a:t>findings</a:t>
-            </a:r>
-            <a:r>
-              <a:rPr lang="pt-BR" sz="2200" dirty="0"/>
-              <a:t> in sample file.</a:t>
+              <a:rPr lang="en-US" sz="2200" noProof="0" dirty="0"/>
+              <a:t>Understanding findings in sample file.</a:t>
             </a:r>
           </a:p>
         </p:txBody>
@@ -5607,7 +5875,7 @@
           <a:lstStyle/>
           <a:p>
             <a:pPr algn="ctr"/>
-            <a:endParaRPr lang="en-US"/>
+            <a:endParaRPr lang="en-US" noProof="0" dirty="0"/>
           </a:p>
         </p:txBody>
       </p:sp>
@@ -5645,7 +5913,7 @@
               </a:lnSpc>
             </a:pPr>
             <a:r>
-              <a:rPr lang="en-US" sz="2500" dirty="0"/>
+              <a:rPr lang="en-US" sz="2500" noProof="0" dirty="0"/>
               <a:t>Fraud Prevention recommendations</a:t>
             </a:r>
           </a:p>
@@ -5748,7 +6016,7 @@
               <a:buNone/>
             </a:pPr>
             <a:r>
-              <a:rPr lang="en-US" sz="1400" b="1" dirty="0"/>
+              <a:rPr lang="en-US" sz="1400" b="1" noProof="0" dirty="0"/>
               <a:t>Hybrid Rule-and-ML Engine</a:t>
             </a:r>
           </a:p>
@@ -5757,7 +6025,7 @@
               <a:buNone/>
             </a:pPr>
             <a:r>
-              <a:rPr lang="en-US" sz="1400" dirty="0"/>
+              <a:rPr lang="en-US" sz="1400" noProof="0" dirty="0"/>
               <a:t>Enforce velocity/amount rules and time window restrictions.</a:t>
             </a:r>
           </a:p>
@@ -5765,14 +6033,14 @@
             <a:pPr marL="0" lvl="1" indent="0">
               <a:buNone/>
             </a:pPr>
-            <a:endParaRPr lang="en-US" sz="1400" b="1" dirty="0"/>
+            <a:endParaRPr lang="en-US" sz="1400" b="1" noProof="0" dirty="0"/>
           </a:p>
           <a:p>
             <a:pPr marL="0" lvl="1" indent="0">
               <a:buNone/>
             </a:pPr>
             <a:r>
-              <a:rPr lang="en-US" sz="1400" b="1" dirty="0"/>
+              <a:rPr lang="en-US" sz="1400" b="1" noProof="0" dirty="0"/>
               <a:t>Step-Up Authentication</a:t>
             </a:r>
           </a:p>
@@ -5781,7 +6049,7 @@
               <a:buNone/>
             </a:pPr>
             <a:r>
-              <a:rPr lang="en-US" sz="1400" dirty="0"/>
+              <a:rPr lang="en-US" sz="1400" noProof="0" dirty="0"/>
               <a:t>Trigger 3D Secure or OTP verification for medium risk transactions (e.g., new device, high value purchase, or off hour order).</a:t>
             </a:r>
           </a:p>
@@ -5789,14 +6057,14 @@
             <a:pPr marL="0" lvl="1" indent="0">
               <a:buNone/>
             </a:pPr>
-            <a:endParaRPr lang="en-US" sz="1400" b="1" dirty="0"/>
+            <a:endParaRPr lang="en-US" sz="1400" b="1" noProof="0" dirty="0"/>
           </a:p>
           <a:p>
             <a:pPr marL="0" lvl="1" indent="0">
               <a:buNone/>
             </a:pPr>
             <a:r>
-              <a:rPr lang="en-US" sz="1400" b="1" dirty="0"/>
+              <a:rPr lang="en-US" sz="1400" b="1" noProof="0" dirty="0"/>
               <a:t>Manual Review &amp; Rapid Response</a:t>
             </a:r>
           </a:p>
@@ -5805,7 +6073,7 @@
               <a:buNone/>
             </a:pPr>
             <a:r>
-              <a:rPr lang="en-US" sz="1400" dirty="0"/>
+              <a:rPr lang="en-US" sz="1400" noProof="0" dirty="0"/>
               <a:t>Automatically route transactions above a specified risk threshold to a specialized team for the same day review.</a:t>
             </a:r>
           </a:p>
@@ -5813,14 +6081,14 @@
             <a:pPr marL="0" lvl="1" indent="0">
               <a:buNone/>
             </a:pPr>
-            <a:endParaRPr lang="en-US" sz="1400" dirty="0"/>
+            <a:endParaRPr lang="en-US" sz="1400" noProof="0" dirty="0"/>
           </a:p>
           <a:p>
             <a:pPr marL="0" lvl="1" indent="0">
               <a:buNone/>
             </a:pPr>
             <a:r>
-              <a:rPr lang="en-US" sz="1400" b="1" dirty="0"/>
+              <a:rPr lang="en-US" sz="1400" b="1" noProof="0" dirty="0"/>
               <a:t>Continuous Monitoring &amp; Feedback Loop</a:t>
             </a:r>
           </a:p>
@@ -5829,7 +6097,7 @@
               <a:buNone/>
             </a:pPr>
             <a:r>
-              <a:rPr lang="en-US" sz="1400" dirty="0"/>
+              <a:rPr lang="en-US" sz="1400" noProof="0" dirty="0"/>
               <a:t>Collect outcome data from disputes and chargeback representments to retrain the ML model and tune rule parameters, ensuring the system adapts to emerging fraud tactics.</a:t>
             </a:r>
           </a:p>
@@ -6141,7 +6409,7 @@
               <a:tabLst/>
               <a:defRPr/>
             </a:pPr>
-            <a:endParaRPr kumimoji="0" lang="en-US" sz="1800" b="0" i="0" u="none" strike="noStrike" kern="1200" cap="none" spc="0" normalizeH="0" baseline="0" noProof="0">
+            <a:endParaRPr kumimoji="0" lang="en-US" sz="1800" b="0" i="0" u="none" strike="noStrike" kern="1200" cap="none" spc="0" normalizeH="0" baseline="0" noProof="0" dirty="0">
               <a:ln>
                 <a:noFill/>
               </a:ln>
@@ -6291,7 +6559,7 @@
           <a:lstStyle/>
           <a:p>
             <a:r>
-              <a:rPr lang="pt-BR" sz="3600"/>
+              <a:rPr lang="en-US" sz="3600" noProof="0" dirty="0"/>
               <a:t>Discussion Topics</a:t>
             </a:r>
           </a:p>
@@ -6335,22 +6603,21 @@
           <a:lstStyle/>
           <a:p>
             <a:r>
-              <a:rPr lang="en-US" dirty="0"/>
+              <a:rPr lang="en-US" noProof="0" dirty="0"/>
               <a:t>Data Analysis &amp; Key Findings</a:t>
             </a:r>
           </a:p>
           <a:p>
             <a:r>
-              <a:rPr lang="en-US" dirty="0"/>
+              <a:rPr lang="en-US" noProof="0" dirty="0"/>
               <a:t>Additional Data to Enhance Fraud Detection</a:t>
             </a:r>
           </a:p>
           <a:p>
             <a:r>
-              <a:rPr lang="en-US" dirty="0"/>
+              <a:rPr lang="en-US" noProof="0" dirty="0"/>
               <a:t>Fraud &amp; Chargeback Prevention Recommendations</a:t>
             </a:r>
-            <a:endParaRPr lang="pt-BR" dirty="0"/>
           </a:p>
         </p:txBody>
       </p:sp>
@@ -6562,7 +6829,7 @@
               <a:tabLst/>
               <a:defRPr/>
             </a:pPr>
-            <a:endParaRPr kumimoji="0" lang="en-US" sz="1800" b="0" i="0" u="none" strike="noStrike" kern="1200" cap="none" spc="0" normalizeH="0" baseline="0" noProof="0">
+            <a:endParaRPr kumimoji="0" lang="en-US" sz="1800" b="0" i="0" u="none" strike="noStrike" kern="1200" cap="none" spc="0" normalizeH="0" baseline="0" noProof="0" dirty="0">
               <a:ln>
                 <a:noFill/>
               </a:ln>
@@ -6608,7 +6875,7 @@
           <a:lstStyle/>
           <a:p>
             <a:r>
-              <a:rPr lang="en-US" sz="8000" dirty="0"/>
+              <a:rPr lang="en-US" sz="8000" noProof="0" dirty="0"/>
               <a:t>Data Analysis &amp; Key Findings</a:t>
             </a:r>
           </a:p>
@@ -6975,7 +7242,7 @@
           <a:lstStyle/>
           <a:p>
             <a:pPr algn="ctr"/>
-            <a:endParaRPr lang="en-US"/>
+            <a:endParaRPr lang="en-US" noProof="0" dirty="0"/>
           </a:p>
         </p:txBody>
       </p:sp>
@@ -7112,24 +7379,8 @@
           <a:lstStyle/>
           <a:p>
             <a:r>
-              <a:rPr lang="pt-BR" dirty="0"/>
-              <a:t>High-</a:t>
-            </a:r>
-            <a:r>
-              <a:rPr lang="pt-BR" dirty="0" err="1"/>
-              <a:t>risk</a:t>
-            </a:r>
-            <a:r>
-              <a:rPr lang="pt-BR" dirty="0"/>
-              <a:t> </a:t>
-            </a:r>
-            <a:r>
-              <a:rPr lang="pt-BR" dirty="0" err="1"/>
-              <a:t>users</a:t>
-            </a:r>
-            <a:r>
-              <a:rPr lang="pt-BR" dirty="0"/>
-              <a:t> &amp; devices</a:t>
+              <a:rPr lang="en-US" noProof="0" dirty="0"/>
+              <a:t>High-risk users &amp; devices</a:t>
             </a:r>
           </a:p>
         </p:txBody>
@@ -7160,29 +7411,29 @@
           <a:bodyPr/>
           <a:lstStyle/>
           <a:p>
-            <a:endParaRPr lang="pt-BR" dirty="0"/>
+            <a:endParaRPr lang="en-US" noProof="0" dirty="0"/>
           </a:p>
           <a:p>
             <a:pPr lvl="1"/>
             <a:r>
-              <a:rPr lang="en-US" dirty="0"/>
+              <a:rPr lang="en-US" noProof="0" dirty="0"/>
               <a:t>The top 5 users account for disproportionately high chargeback rates (81%–93%), despite being a small fraction of total transactions.</a:t>
             </a:r>
-            <a:endParaRPr lang="pt-BR" sz="2000" dirty="0"/>
-          </a:p>
-          <a:p>
-            <a:endParaRPr lang="pt-BR" dirty="0"/>
+            <a:endParaRPr lang="en-US" sz="2000" noProof="0" dirty="0"/>
+          </a:p>
+          <a:p>
+            <a:endParaRPr lang="en-US" noProof="0" dirty="0"/>
           </a:p>
           <a:p>
             <a:pPr lvl="1"/>
             <a:r>
-              <a:rPr lang="en-US" dirty="0"/>
+              <a:rPr lang="en-US" noProof="0" dirty="0"/>
               <a:t>Similarly, a handful of devices show both elevated chargeback counts and rates (up to 93%).</a:t>
             </a:r>
-            <a:endParaRPr lang="pt-BR" sz="2000" dirty="0"/>
-          </a:p>
-          <a:p>
-            <a:endParaRPr lang="pt-BR" dirty="0"/>
+            <a:endParaRPr lang="en-US" sz="2000" noProof="0" dirty="0"/>
+          </a:p>
+          <a:p>
+            <a:endParaRPr lang="en-US" noProof="0" dirty="0"/>
           </a:p>
         </p:txBody>
       </p:sp>
@@ -7469,7 +7720,7 @@
           <a:lstStyle/>
           <a:p>
             <a:pPr algn="ctr"/>
-            <a:endParaRPr lang="en-US"/>
+            <a:endParaRPr lang="en-US" noProof="0" dirty="0"/>
           </a:p>
         </p:txBody>
       </p:sp>
@@ -7606,10 +7857,9 @@
           <a:lstStyle/>
           <a:p>
             <a:r>
-              <a:rPr lang="en-US" dirty="0"/>
+              <a:rPr lang="en-US" noProof="0" dirty="0"/>
               <a:t>Amount Based “Test and Hit” Patterns</a:t>
             </a:r>
-            <a:endParaRPr lang="pt-BR" dirty="0"/>
           </a:p>
         </p:txBody>
       </p:sp>
@@ -7639,15 +7889,15 @@
           <a:bodyPr/>
           <a:lstStyle/>
           <a:p>
-            <a:endParaRPr lang="pt-BR" dirty="0"/>
+            <a:endParaRPr lang="en-US" noProof="0" dirty="0"/>
           </a:p>
           <a:p>
             <a:pPr lvl="1"/>
             <a:r>
-              <a:rPr lang="en-US" dirty="0"/>
+              <a:rPr lang="en-US" noProof="0" dirty="0"/>
               <a:t>Chargeback frequency peaks in low‑value bins (R$0–100 and R$100–200), then drops sharply, then briefly resurges at mid/high values, consistent with “test small amount → validate stolen card → commit larger fraud”.</a:t>
             </a:r>
-            <a:endParaRPr lang="pt-BR" sz="2000" dirty="0"/>
+            <a:endParaRPr lang="en-US" sz="2000" noProof="0" dirty="0"/>
           </a:p>
         </p:txBody>
       </p:sp>
@@ -7904,7 +8154,7 @@
           <a:lstStyle/>
           <a:p>
             <a:pPr algn="ctr"/>
-            <a:endParaRPr lang="en-US"/>
+            <a:endParaRPr lang="en-US" noProof="0" dirty="0"/>
           </a:p>
         </p:txBody>
       </p:sp>
@@ -8041,10 +8291,9 @@
           <a:lstStyle/>
           <a:p>
             <a:r>
-              <a:rPr lang="en-US" dirty="0"/>
+              <a:rPr lang="en-US" noProof="0" dirty="0"/>
               <a:t>Temporal clustering</a:t>
             </a:r>
-            <a:endParaRPr lang="pt-BR" dirty="0"/>
           </a:p>
         </p:txBody>
       </p:sp>
@@ -8074,15 +8323,15 @@
           <a:bodyPr/>
           <a:lstStyle/>
           <a:p>
-            <a:endParaRPr lang="pt-BR" dirty="0"/>
+            <a:endParaRPr lang="en-US" noProof="0" dirty="0"/>
           </a:p>
           <a:p>
             <a:pPr lvl="1"/>
             <a:r>
-              <a:rPr lang="en-US" dirty="0"/>
+              <a:rPr lang="en-US" noProof="0" dirty="0"/>
               <a:t>Chargebacks cluster in off‑peak hours, showing automated or scripted fraud tries when human review may be slowest.</a:t>
             </a:r>
-            <a:endParaRPr lang="pt-BR" sz="2000" dirty="0"/>
+            <a:endParaRPr lang="en-US" sz="2000" noProof="0" dirty="0"/>
           </a:p>
         </p:txBody>
       </p:sp>
@@ -8232,7 +8481,7 @@
               <a:tabLst/>
               <a:defRPr/>
             </a:pPr>
-            <a:endParaRPr kumimoji="0" lang="en-US" sz="1800" b="0" i="0" u="none" strike="noStrike" kern="1200" cap="none" spc="0" normalizeH="0" baseline="0" noProof="0">
+            <a:endParaRPr kumimoji="0" lang="en-US" sz="1800" b="0" i="0" u="none" strike="noStrike" kern="1200" cap="none" spc="0" normalizeH="0" baseline="0" noProof="0" dirty="0">
               <a:ln>
                 <a:noFill/>
               </a:ln>
@@ -8278,10 +8527,9 @@
           <a:lstStyle/>
           <a:p>
             <a:r>
-              <a:rPr lang="en-US" sz="7600" dirty="0"/>
+              <a:rPr lang="en-US" sz="7600" noProof="0" dirty="0"/>
               <a:t>Additional Data to Enhance Fraud Detection</a:t>
             </a:r>
-            <a:endParaRPr lang="pt-BR" sz="7600" dirty="0"/>
           </a:p>
         </p:txBody>
       </p:sp>
@@ -8646,7 +8894,7 @@
           <a:lstStyle/>
           <a:p>
             <a:pPr algn="ctr"/>
-            <a:endParaRPr lang="en-US"/>
+            <a:endParaRPr lang="en-US" noProof="0" dirty="0"/>
           </a:p>
         </p:txBody>
       </p:sp>
@@ -8684,7 +8932,7 @@
               </a:lnSpc>
             </a:pPr>
             <a:r>
-              <a:rPr lang="en-US" dirty="0"/>
+              <a:rPr lang="en-US" noProof="0" dirty="0"/>
               <a:t>Future integrations</a:t>
             </a:r>
           </a:p>
@@ -8820,7 +9068,7 @@
               <a:buNone/>
             </a:pPr>
             <a:r>
-              <a:rPr lang="en-US" sz="1400" b="1" dirty="0"/>
+              <a:rPr lang="en-US" sz="1400" b="1" noProof="0" dirty="0"/>
               <a:t>Device &amp; Network Metadata</a:t>
             </a:r>
           </a:p>
@@ -8829,7 +9077,7 @@
               <a:buNone/>
             </a:pPr>
             <a:r>
-              <a:rPr lang="en-US" sz="1400" dirty="0"/>
+              <a:rPr lang="en-US" sz="1400" noProof="0" dirty="0"/>
               <a:t>IP geolocation, VPN/proxy flags, browser fingerprint scores, and device fingerprinting.</a:t>
             </a:r>
           </a:p>
@@ -8837,14 +9085,14 @@
             <a:pPr marL="0" lvl="1" indent="0">
               <a:buNone/>
             </a:pPr>
-            <a:endParaRPr lang="en-US" sz="1400" b="1" dirty="0"/>
+            <a:endParaRPr lang="en-US" sz="1400" b="1" noProof="0" dirty="0"/>
           </a:p>
           <a:p>
             <a:pPr marL="0" lvl="1" indent="0">
               <a:buNone/>
             </a:pPr>
             <a:r>
-              <a:rPr lang="en-US" sz="1400" b="1" dirty="0"/>
+              <a:rPr lang="en-US" sz="1400" b="1" noProof="0" dirty="0"/>
               <a:t>Customer Profile &amp; Historical Trends</a:t>
             </a:r>
           </a:p>
@@ -8853,7 +9101,7 @@
               <a:buNone/>
             </a:pPr>
             <a:r>
-              <a:rPr lang="en-US" sz="1400" dirty="0"/>
+              <a:rPr lang="en-US" sz="1400" noProof="0" dirty="0"/>
               <a:t>Lifetime chargeback history, average order value per user, and account age.</a:t>
             </a:r>
           </a:p>
@@ -8861,14 +9109,14 @@
             <a:pPr marL="0" lvl="1" indent="0">
               <a:buNone/>
             </a:pPr>
-            <a:endParaRPr lang="en-US" sz="1400" b="1" dirty="0"/>
+            <a:endParaRPr lang="en-US" sz="1400" b="1" noProof="0" dirty="0"/>
           </a:p>
           <a:p>
             <a:pPr marL="0" lvl="1" indent="0">
               <a:buNone/>
             </a:pPr>
             <a:r>
-              <a:rPr lang="en-US" sz="1400" b="1" dirty="0"/>
+              <a:rPr lang="en-US" sz="1400" b="1" noProof="0" dirty="0"/>
               <a:t>Order Fulfillment Data</a:t>
             </a:r>
           </a:p>
@@ -8877,7 +9125,7 @@
               <a:buNone/>
             </a:pPr>
             <a:r>
-              <a:rPr lang="en-US" sz="1400" dirty="0"/>
+              <a:rPr lang="en-US" sz="1400" noProof="0" dirty="0"/>
               <a:t>Shipping address velocity (same address used by multiple cards), carrier GPS stamps, and proof of delivery images.</a:t>
             </a:r>
           </a:p>
@@ -8885,14 +9133,14 @@
             <a:pPr marL="0" lvl="1" indent="0">
               <a:buNone/>
             </a:pPr>
-            <a:endParaRPr lang="en-US" sz="1400" dirty="0"/>
+            <a:endParaRPr lang="en-US" sz="1400" noProof="0" dirty="0"/>
           </a:p>
           <a:p>
             <a:pPr marL="0" lvl="1" indent="0">
               <a:buNone/>
             </a:pPr>
             <a:r>
-              <a:rPr lang="en-US" sz="1400" b="1" dirty="0"/>
+              <a:rPr lang="en-US" sz="1400" b="1" noProof="0" dirty="0"/>
               <a:t>External Fraud Feeds</a:t>
             </a:r>
           </a:p>
@@ -8901,7 +9149,7 @@
               <a:buNone/>
             </a:pPr>
             <a:r>
-              <a:rPr lang="en-US" sz="1400" dirty="0"/>
+              <a:rPr lang="en-US" sz="1400" noProof="0" dirty="0"/>
               <a:t>BIN risk scores, global fraud deny lists, and peer network alerts from other merchants.</a:t>
             </a:r>
           </a:p>
@@ -8909,7 +9157,7 @@
             <a:pPr marL="0" lvl="1" indent="0">
               <a:buNone/>
             </a:pPr>
-            <a:endParaRPr lang="pt-BR" sz="1400" dirty="0"/>
+            <a:endParaRPr lang="en-US" sz="1400" noProof="0" dirty="0"/>
           </a:p>
         </p:txBody>
       </p:sp>
@@ -9173,7 +9421,7 @@
               <a:tabLst/>
               <a:defRPr/>
             </a:pPr>
-            <a:endParaRPr kumimoji="0" lang="en-US" sz="1800" b="0" i="0" u="none" strike="noStrike" kern="1200" cap="none" spc="0" normalizeH="0" baseline="0" noProof="0">
+            <a:endParaRPr kumimoji="0" lang="en-US" sz="1800" b="0" i="0" u="none" strike="noStrike" kern="1200" cap="none" spc="0" normalizeH="0" baseline="0" noProof="0" dirty="0">
               <a:ln>
                 <a:noFill/>
               </a:ln>
@@ -9219,34 +9467,9 @@
           <a:lstStyle/>
           <a:p>
             <a:r>
-              <a:rPr lang="pt-BR" sz="7600" dirty="0" err="1"/>
-              <a:t>Fraud</a:t>
-            </a:r>
-            <a:r>
-              <a:rPr lang="pt-BR" sz="7600" dirty="0"/>
-              <a:t> &amp; </a:t>
-            </a:r>
-            <a:r>
-              <a:rPr lang="pt-BR" sz="7600" dirty="0" err="1"/>
-              <a:t>Chargeback</a:t>
-            </a:r>
-            <a:r>
-              <a:rPr lang="pt-BR" sz="7600" dirty="0"/>
-              <a:t> </a:t>
-            </a:r>
-            <a:r>
-              <a:rPr lang="pt-BR" sz="7600" dirty="0" err="1"/>
-              <a:t>Prevention</a:t>
-            </a:r>
-            <a:r>
-              <a:rPr lang="pt-BR" sz="7600" dirty="0"/>
-              <a:t> </a:t>
-            </a:r>
-            <a:r>
-              <a:rPr lang="pt-BR" sz="7600" dirty="0" err="1"/>
-              <a:t>Recommendations</a:t>
-            </a:r>
-            <a:endParaRPr lang="pt-BR" sz="7600" dirty="0"/>
+              <a:rPr lang="en-US" sz="7600" noProof="0" dirty="0"/>
+              <a:t>Fraud &amp; Chargeback Prevention Recommendations</a:t>
+            </a:r>
           </a:p>
         </p:txBody>
       </p:sp>

</xml_diff>

<commit_message>
Update payment and transaction presentation slides
Revised 'Payment Ecosystem Overview.pptx' and 'Transaction Analysis.pptx' in the docs/presentations directory. The updates may include new content, corrections, or formatting improvements.
</commit_message>
<xml_diff>
--- a/docs/presentations/Transaction Analysis.pptx
+++ b/docs/presentations/Transaction Analysis.pptx
@@ -236,7 +236,7 @@
           <a:p>
             <a:fld id="{F3F9DEFF-DB17-4A8B-B6B3-A9CBC0CD3C02}" type="datetimeFigureOut">
               <a:rPr lang="pt-BR" smtClean="0"/>
-              <a:t>29/07/2025</a:t>
+              <a:t>31/07/2025</a:t>
             </a:fld>
             <a:endParaRPr lang="pt-BR"/>
           </a:p>
@@ -1316,11 +1316,11 @@
             </a:r>
             <a:r>
               <a:rPr lang="en-US" b="1" dirty="0"/>
-              <a:t>off‑peak hours</a:t>
+              <a:t>off‑peak hours </a:t>
             </a:r>
             <a:r>
               <a:rPr lang="en-US" dirty="0"/>
-              <a:t>—particularly midnight to 4 a.m.—when manual review is slowest.”</a:t>
+              <a:t>when manual review is slowest.”</a:t>
             </a:r>
           </a:p>
           <a:p>
@@ -1858,7 +1858,7 @@
           <a:p>
             <a:fld id="{D1D1EADE-8E88-4C7C-8AC5-FB148DE4940E}" type="datetime1">
               <a:rPr lang="en-US" smtClean="0"/>
-              <a:t>7/29/2025</a:t>
+              <a:t>7/31/2025</a:t>
             </a:fld>
             <a:endParaRPr lang="en-US"/>
           </a:p>
@@ -2058,7 +2058,7 @@
           <a:p>
             <a:fld id="{EC3C8B9C-477D-492A-96AD-1FC2CC997A73}" type="datetime1">
               <a:rPr lang="en-US" smtClean="0"/>
-              <a:t>7/29/2025</a:t>
+              <a:t>7/31/2025</a:t>
             </a:fld>
             <a:endParaRPr lang="en-US"/>
           </a:p>
@@ -2268,7 +2268,7 @@
           <a:p>
             <a:fld id="{42D3AED5-E26D-4E29-B1B3-7847B6779594}" type="datetime1">
               <a:rPr lang="en-US" smtClean="0"/>
-              <a:t>7/29/2025</a:t>
+              <a:t>7/31/2025</a:t>
             </a:fld>
             <a:endParaRPr lang="en-US"/>
           </a:p>
@@ -2468,7 +2468,7 @@
           <a:p>
             <a:fld id="{157B6794-849E-4626-908B-D15793550EFB}" type="datetime1">
               <a:rPr lang="en-US" smtClean="0"/>
-              <a:t>7/29/2025</a:t>
+              <a:t>7/31/2025</a:t>
             </a:fld>
             <a:endParaRPr lang="en-US"/>
           </a:p>
@@ -2744,7 +2744,7 @@
           <a:p>
             <a:fld id="{63DB64E7-5594-42A3-ADBF-E95A7ACEAD64}" type="datetime1">
               <a:rPr lang="en-US" smtClean="0"/>
-              <a:t>7/29/2025</a:t>
+              <a:t>7/31/2025</a:t>
             </a:fld>
             <a:endParaRPr lang="en-US"/>
           </a:p>
@@ -3017,7 +3017,7 @@
           <a:p>
             <a:fld id="{18462B0B-D248-4FFB-8695-AD7FA4B1284A}" type="datetime1">
               <a:rPr lang="en-US" smtClean="0"/>
-              <a:t>7/29/2025</a:t>
+              <a:t>7/31/2025</a:t>
             </a:fld>
             <a:endParaRPr lang="en-US"/>
           </a:p>
@@ -3440,7 +3440,7 @@
           <a:p>
             <a:fld id="{D0378EFB-9159-4510-B73F-4F0409ADE937}" type="datetime1">
               <a:rPr lang="en-US" smtClean="0"/>
-              <a:t>7/29/2025</a:t>
+              <a:t>7/31/2025</a:t>
             </a:fld>
             <a:endParaRPr lang="en-US"/>
           </a:p>
@@ -3582,7 +3582,7 @@
           <a:p>
             <a:fld id="{89BC9412-2452-4BED-A324-9D8C115361AD}" type="datetime1">
               <a:rPr lang="en-US" smtClean="0"/>
-              <a:t>7/29/2025</a:t>
+              <a:t>7/31/2025</a:t>
             </a:fld>
             <a:endParaRPr lang="en-US"/>
           </a:p>
@@ -3695,7 +3695,7 @@
           <a:p>
             <a:fld id="{F5318F62-D251-40E8-A23C-F4CFE9FEAB41}" type="datetime1">
               <a:rPr lang="en-US" smtClean="0"/>
-              <a:t>7/29/2025</a:t>
+              <a:t>7/31/2025</a:t>
             </a:fld>
             <a:endParaRPr lang="en-US"/>
           </a:p>
@@ -4008,7 +4008,7 @@
           <a:p>
             <a:fld id="{44F76144-149E-4874-93A5-554A0357CF82}" type="datetime1">
               <a:rPr lang="en-US" smtClean="0"/>
-              <a:t>7/29/2025</a:t>
+              <a:t>7/31/2025</a:t>
             </a:fld>
             <a:endParaRPr lang="en-US"/>
           </a:p>
@@ -4301,7 +4301,7 @@
           <a:p>
             <a:fld id="{50BA65D8-0540-4835-AE5C-25D29DBA01BE}" type="datetime1">
               <a:rPr lang="en-US" smtClean="0"/>
-              <a:t>7/29/2025</a:t>
+              <a:t>7/31/2025</a:t>
             </a:fld>
             <a:endParaRPr lang="en-US"/>
           </a:p>
@@ -4543,7 +4543,7 @@
           <a:p>
             <a:fld id="{E31BA835-12AC-4E8F-955A-EA3F4DE2791F}" type="datetime1">
               <a:rPr lang="en-US" smtClean="0"/>
-              <a:t>7/29/2025</a:t>
+              <a:t>7/31/2025</a:t>
             </a:fld>
             <a:endParaRPr lang="en-US"/>
           </a:p>

</xml_diff>